<commit_message>
Fix name and add image
Former-commit-id: 9112eaa75aa2ad269c699e38ec87a493c42d9132
</commit_message>
<xml_diff>
--- a/sys_doc/presentation/20230117_TeamRot_Ergebnis.pptx
+++ b/sys_doc/presentation/20230117_TeamRot_Ergebnis.pptx
@@ -5,18 +5,19 @@
     <p:sldMasterId id="2147483729" r:id="rId1"/>
   </p:sldMasterIdLst>
   <p:notesMasterIdLst>
-    <p:notesMasterId r:id="rId8"/>
+    <p:notesMasterId r:id="rId9"/>
   </p:notesMasterIdLst>
   <p:handoutMasterIdLst>
-    <p:handoutMasterId r:id="rId9"/>
+    <p:handoutMasterId r:id="rId10"/>
   </p:handoutMasterIdLst>
   <p:sldIdLst>
     <p:sldId id="256" r:id="rId2"/>
     <p:sldId id="257" r:id="rId3"/>
     <p:sldId id="661" r:id="rId4"/>
     <p:sldId id="664" r:id="rId5"/>
-    <p:sldId id="665" r:id="rId6"/>
-    <p:sldId id="666" r:id="rId7"/>
+    <p:sldId id="667" r:id="rId6"/>
+    <p:sldId id="665" r:id="rId7"/>
+    <p:sldId id="666" r:id="rId8"/>
   </p:sldIdLst>
   <p:sldSz cx="9144000" cy="6858000" type="screen4x3"/>
   <p:notesSz cx="7104063" cy="10234613"/>
@@ -1364,63 +1365,111 @@
       </p:grpSpPr>
       <p:sp>
         <p:nvSpPr>
-          <p:cNvPr id="2" name="Folienbildplatzhalter 1"/>
-          <p:cNvSpPr>
-            <a:spLocks noGrp="1" noRot="1" noChangeAspect="1"/>
-          </p:cNvSpPr>
-          <p:nvPr>
-            <p:ph type="sldImg"/>
-          </p:nvPr>
-        </p:nvSpPr>
-        <p:spPr/>
-      </p:sp>
-      <p:sp>
-        <p:nvSpPr>
-          <p:cNvPr id="3" name="Notizenplatzhalter 2"/>
-          <p:cNvSpPr>
-            <a:spLocks noGrp="1"/>
-          </p:cNvSpPr>
-          <p:nvPr>
-            <p:ph type="body" idx="1"/>
-          </p:nvPr>
-        </p:nvSpPr>
-        <p:spPr/>
-        <p:txBody>
-          <a:bodyPr/>
+          <p:cNvPr id="10242" name="Rectangle 7"/>
+          <p:cNvSpPr>
+            <a:spLocks noGrp="1" noChangeArrowheads="1"/>
+          </p:cNvSpPr>
+          <p:nvPr>
+            <p:ph type="sldNum" sz="quarter" idx="5"/>
+          </p:nvPr>
+        </p:nvSpPr>
+        <p:spPr bwMode="auto">
+          <a:ln>
+            <a:miter lim="800000"/>
+            <a:headEnd/>
+            <a:tailEnd/>
+          </a:ln>
+        </p:spPr>
+        <p:txBody>
+          <a:bodyPr wrap="square" numCol="1" anchorCtr="0" compatLnSpc="1">
+            <a:prstTxWarp prst="textNoShape">
+              <a:avLst/>
+            </a:prstTxWarp>
+          </a:bodyPr>
           <a:lstStyle/>
           <a:p>
-            <a:endParaRPr lang="de-DE" dirty="0"/>
-          </a:p>
-        </p:txBody>
-      </p:sp>
-      <p:sp>
-        <p:nvSpPr>
-          <p:cNvPr id="4" name="Foliennummernplatzhalter 3"/>
-          <p:cNvSpPr>
-            <a:spLocks noGrp="1"/>
-          </p:cNvSpPr>
-          <p:nvPr>
-            <p:ph type="sldNum" sz="quarter" idx="5"/>
-          </p:nvPr>
-        </p:nvSpPr>
-        <p:spPr/>
-        <p:txBody>
-          <a:bodyPr/>
-          <a:lstStyle/>
-          <a:p>
-            <a:fld id="{6E291615-FAF7-4493-A686-6F4E1EA06A90}" type="slidenum">
+            <a:pPr defTabSz="912813" fontAlgn="base">
+              <a:spcBef>
+                <a:spcPct val="0"/>
+              </a:spcBef>
+              <a:spcAft>
+                <a:spcPct val="0"/>
+              </a:spcAft>
+              <a:defRPr/>
+            </a:pPr>
+            <a:fld id="{1CD6FD4F-51A4-466E-905A-65C5C2AF801C}" type="slidenum">
               <a:rPr lang="de-DE" smtClean="0"/>
-              <a:pPr/>
+              <a:pPr defTabSz="912813" fontAlgn="base">
+                <a:spcBef>
+                  <a:spcPct val="0"/>
+                </a:spcBef>
+                <a:spcAft>
+                  <a:spcPct val="0"/>
+                </a:spcAft>
+                <a:defRPr/>
+              </a:pPr>
               <a:t>5</a:t>
             </a:fld>
             <a:endParaRPr lang="de-DE" dirty="0"/>
           </a:p>
         </p:txBody>
       </p:sp>
+      <p:sp>
+        <p:nvSpPr>
+          <p:cNvPr id="10243" name="Rectangle 2"/>
+          <p:cNvSpPr>
+            <a:spLocks noGrp="1" noRot="1" noChangeAspect="1" noChangeArrowheads="1" noTextEdit="1"/>
+          </p:cNvSpPr>
+          <p:nvPr>
+            <p:ph type="sldImg"/>
+          </p:nvPr>
+        </p:nvSpPr>
+        <p:spPr bwMode="auto">
+          <a:noFill/>
+          <a:ln>
+            <a:solidFill>
+              <a:srgbClr val="000000"/>
+            </a:solidFill>
+            <a:miter lim="800000"/>
+            <a:headEnd/>
+            <a:tailEnd/>
+          </a:ln>
+        </p:spPr>
+      </p:sp>
+      <p:sp>
+        <p:nvSpPr>
+          <p:cNvPr id="10244" name="Rectangle 3"/>
+          <p:cNvSpPr>
+            <a:spLocks noGrp="1" noChangeArrowheads="1"/>
+          </p:cNvSpPr>
+          <p:nvPr>
+            <p:ph type="body" idx="1"/>
+          </p:nvPr>
+        </p:nvSpPr>
+        <p:spPr bwMode="auto">
+          <a:noFill/>
+        </p:spPr>
+        <p:txBody>
+          <a:bodyPr wrap="square" numCol="1" anchor="t" anchorCtr="0" compatLnSpc="1">
+            <a:prstTxWarp prst="textNoShape">
+              <a:avLst/>
+            </a:prstTxWarp>
+          </a:bodyPr>
+          <a:lstStyle/>
+          <a:p>
+            <a:pPr eaLnBrk="1" hangingPunct="1">
+              <a:spcBef>
+                <a:spcPct val="0"/>
+              </a:spcBef>
+            </a:pPr>
+            <a:endParaRPr lang="de-DE" dirty="0"/>
+          </a:p>
+        </p:txBody>
+      </p:sp>
     </p:spTree>
     <p:extLst>
       <p:ext uri="{BB962C8B-B14F-4D97-AF65-F5344CB8AC3E}">
-        <p14:creationId xmlns:p14="http://schemas.microsoft.com/office/powerpoint/2010/main" val="3220267755"/>
+        <p14:creationId xmlns:p14="http://schemas.microsoft.com/office/powerpoint/2010/main" val="3527025820"/>
       </p:ext>
     </p:extLst>
   </p:cSld>
@@ -1449,6 +1498,91 @@
       </p:grpSpPr>
       <p:sp>
         <p:nvSpPr>
+          <p:cNvPr id="2" name="Folienbildplatzhalter 1"/>
+          <p:cNvSpPr>
+            <a:spLocks noGrp="1" noRot="1" noChangeAspect="1"/>
+          </p:cNvSpPr>
+          <p:nvPr>
+            <p:ph type="sldImg"/>
+          </p:nvPr>
+        </p:nvSpPr>
+        <p:spPr/>
+      </p:sp>
+      <p:sp>
+        <p:nvSpPr>
+          <p:cNvPr id="3" name="Notizenplatzhalter 2"/>
+          <p:cNvSpPr>
+            <a:spLocks noGrp="1"/>
+          </p:cNvSpPr>
+          <p:nvPr>
+            <p:ph type="body" idx="1"/>
+          </p:nvPr>
+        </p:nvSpPr>
+        <p:spPr/>
+        <p:txBody>
+          <a:bodyPr/>
+          <a:lstStyle/>
+          <a:p>
+            <a:endParaRPr lang="de-DE" dirty="0"/>
+          </a:p>
+        </p:txBody>
+      </p:sp>
+      <p:sp>
+        <p:nvSpPr>
+          <p:cNvPr id="4" name="Foliennummernplatzhalter 3"/>
+          <p:cNvSpPr>
+            <a:spLocks noGrp="1"/>
+          </p:cNvSpPr>
+          <p:nvPr>
+            <p:ph type="sldNum" sz="quarter" idx="5"/>
+          </p:nvPr>
+        </p:nvSpPr>
+        <p:spPr/>
+        <p:txBody>
+          <a:bodyPr/>
+          <a:lstStyle/>
+          <a:p>
+            <a:fld id="{6E291615-FAF7-4493-A686-6F4E1EA06A90}" type="slidenum">
+              <a:rPr lang="de-DE" smtClean="0"/>
+              <a:pPr/>
+              <a:t>6</a:t>
+            </a:fld>
+            <a:endParaRPr lang="de-DE" dirty="0"/>
+          </a:p>
+        </p:txBody>
+      </p:sp>
+    </p:spTree>
+    <p:extLst>
+      <p:ext uri="{BB962C8B-B14F-4D97-AF65-F5344CB8AC3E}">
+        <p14:creationId xmlns:p14="http://schemas.microsoft.com/office/powerpoint/2010/main" val="3220267755"/>
+      </p:ext>
+    </p:extLst>
+  </p:cSld>
+  <p:clrMapOvr>
+    <a:masterClrMapping/>
+  </p:clrMapOvr>
+</p:notes>
+</file>
+
+<file path=ppt/notesSlides/notesSlide7.xml><?xml version="1.0" encoding="utf-8"?>
+<p:notes xmlns:a="http://schemas.openxmlformats.org/drawingml/2006/main" xmlns:r="http://schemas.openxmlformats.org/officeDocument/2006/relationships" xmlns:p="http://schemas.openxmlformats.org/presentationml/2006/main">
+  <p:cSld>
+    <p:spTree>
+      <p:nvGrpSpPr>
+        <p:cNvPr id="1" name=""/>
+        <p:cNvGrpSpPr/>
+        <p:nvPr/>
+      </p:nvGrpSpPr>
+      <p:grpSpPr>
+        <a:xfrm>
+          <a:off x="0" y="0"/>
+          <a:ext cx="0" cy="0"/>
+          <a:chOff x="0" y="0"/>
+          <a:chExt cx="0" cy="0"/>
+        </a:xfrm>
+      </p:grpSpPr>
+      <p:sp>
+        <p:nvSpPr>
           <p:cNvPr id="10242" name="Rectangle 7"/>
           <p:cNvSpPr>
             <a:spLocks noGrp="1" noChangeArrowheads="1"/>
@@ -1492,7 +1626,7 @@
                 </a:spcAft>
                 <a:defRPr/>
               </a:pPr>
-              <a:t>6</a:t>
+              <a:t>7</a:t>
             </a:fld>
             <a:endParaRPr lang="de-DE" dirty="0"/>
           </a:p>
@@ -5307,7 +5441,7 @@
             </a:r>
             <a:r>
               <a:rPr lang="de-DE" dirty="0" err="1"/>
-              <a:t>P.Korinth</a:t>
+              <a:t>A.Imeraj</a:t>
             </a:r>
             <a:r>
               <a:rPr lang="de-DE" dirty="0"/>
@@ -5315,7 +5449,7 @@
             </a:r>
             <a:r>
               <a:rPr lang="de-DE" dirty="0" err="1"/>
-              <a:t>P.Stangel</a:t>
+              <a:t>P.Korinth</a:t>
             </a:r>
             <a:r>
               <a:rPr lang="de-DE" dirty="0"/>
@@ -5323,7 +5457,7 @@
             </a:r>
             <a:r>
               <a:rPr lang="de-DE" dirty="0" err="1"/>
-              <a:t>A.Imeraj</a:t>
+              <a:t>P.Stangl</a:t>
             </a:r>
             <a:endParaRPr lang="de-DE" dirty="0"/>
           </a:p>
@@ -6152,7 +6286,7 @@
               <a:rPr lang="de-DE" dirty="0">
                 <a:latin typeface="Meta Pro" panose="02000503040000020004" pitchFamily="2" charset="0"/>
               </a:rPr>
-              <a:t>Aufbau &amp; Kommunikation</a:t>
+              <a:t> Bausteinsicht &amp; Verteilungssicht </a:t>
             </a:r>
           </a:p>
         </p:txBody>
@@ -6313,7 +6447,7 @@
               <a:rPr lang="de-DE" dirty="0">
                 <a:latin typeface="Meta Pro" panose="02000503040000020004" pitchFamily="2" charset="0"/>
               </a:rPr>
-              <a:t>Aufbau &amp; Kommunikation</a:t>
+              <a:t>Bausteinsicht &amp; Verteilungssicht </a:t>
             </a:r>
           </a:p>
         </p:txBody>
@@ -6465,225 +6599,6 @@
           <a:xfrm>
             <a:off x="0" y="2202104"/>
             <a:ext cx="9144000" cy="2453792"/>
-          </a:xfrm>
-          <a:prstGeom prst="rect">
-            <a:avLst/>
-          </a:prstGeom>
-        </p:spPr>
-      </p:pic>
-      <p:pic>
-        <p:nvPicPr>
-          <p:cNvPr id="15" name="Grafik 14">
-            <a:extLst>
-              <a:ext uri="{FF2B5EF4-FFF2-40B4-BE49-F238E27FC236}">
-                <a16:creationId xmlns:a16="http://schemas.microsoft.com/office/drawing/2014/main" id="{5BDE80EC-ED25-AC50-62AD-6D8243F85461}"/>
-              </a:ext>
-            </a:extLst>
-          </p:cNvPr>
-          <p:cNvPicPr>
-            <a:picLocks noChangeAspect="1"/>
-          </p:cNvPicPr>
-          <p:nvPr/>
-        </p:nvPicPr>
-        <p:blipFill>
-          <a:blip r:embed="rId4">
-            <a:extLst>
-              <a:ext uri="{BEBA8EAE-BF5A-486C-A8C5-ECC9F3942E4B}">
-                <a14:imgProps xmlns:a14="http://schemas.microsoft.com/office/drawing/2010/main">
-                  <a14:imgLayer r:embed="rId5">
-                    <a14:imgEffect>
-                      <a14:backgroundRemoval t="0" b="98667" l="1778" r="99556">
-                        <a14:foregroundMark x1="30222" y1="20444" x2="30222" y2="20444"/>
-                        <a14:foregroundMark x1="32444" y1="20444" x2="62667" y2="20889"/>
-                        <a14:foregroundMark x1="65333" y1="21778" x2="65333" y2="58222"/>
-                        <a14:foregroundMark x1="65333" y1="58222" x2="35111" y2="68889"/>
-                        <a14:foregroundMark x1="35111" y1="68889" x2="8444" y2="47111"/>
-                        <a14:foregroundMark x1="8444" y1="47111" x2="46667" y2="15111"/>
-                        <a14:foregroundMark x1="46667" y1="15111" x2="74222" y2="13333"/>
-                        <a14:foregroundMark x1="74222" y1="13333" x2="88889" y2="39556"/>
-                        <a14:foregroundMark x1="88889" y1="39556" x2="79111" y2="70667"/>
-                        <a14:foregroundMark x1="79111" y1="70667" x2="52444" y2="88444"/>
-                        <a14:foregroundMark x1="52444" y1="88444" x2="31556" y2="57778"/>
-                        <a14:foregroundMark x1="31556" y1="57778" x2="54222" y2="41778"/>
-                        <a14:foregroundMark x1="54222" y1="41778" x2="36444" y2="56889"/>
-                        <a14:foregroundMark x1="36444" y1="56889" x2="62667" y2="50222"/>
-                        <a14:foregroundMark x1="62667" y1="50222" x2="58222" y2="42667"/>
-                        <a14:foregroundMark x1="48444" y1="40889" x2="44444" y2="34667"/>
-                        <a14:foregroundMark x1="47111" y1="6667" x2="51111" y2="4889"/>
-                        <a14:foregroundMark x1="2222" y1="48000" x2="4889" y2="60000"/>
-                        <a14:foregroundMark x1="68889" y1="44444" x2="76889" y2="52444"/>
-                        <a14:foregroundMark x1="61778" y1="50222" x2="50222" y2="30222"/>
-                        <a14:foregroundMark x1="50222" y1="30222" x2="32889" y2="45333"/>
-                        <a14:foregroundMark x1="32889" y1="45333" x2="40444" y2="48000"/>
-                        <a14:foregroundMark x1="52000" y1="98667" x2="43111" y2="92000"/>
-                        <a14:foregroundMark x1="96000" y1="42667" x2="96444" y2="53333"/>
-                        <a14:foregroundMark x1="44889" y1="51556" x2="43556" y2="41778"/>
-                        <a14:foregroundMark x1="53333" y1="444" x2="50667" y2="889"/>
-                        <a14:foregroundMark x1="58222" y1="39111" x2="43556" y2="44000"/>
-                        <a14:foregroundMark x1="43556" y1="44000" x2="44444" y2="38667"/>
-                        <a14:foregroundMark x1="41333" y1="44000" x2="39111" y2="44889"/>
-                        <a14:foregroundMark x1="99111" y1="53333" x2="99556" y2="52889"/>
-                      </a14:backgroundRemoval>
-                    </a14:imgEffect>
-                  </a14:imgLayer>
-                </a14:imgProps>
-              </a:ext>
-            </a:extLst>
-          </a:blip>
-          <a:stretch>
-            <a:fillRect/>
-          </a:stretch>
-        </p:blipFill>
-        <p:spPr>
-          <a:xfrm>
-            <a:off x="1691736" y="2276872"/>
-            <a:ext cx="252000" cy="252000"/>
-          </a:xfrm>
-          <a:prstGeom prst="rect">
-            <a:avLst/>
-          </a:prstGeom>
-        </p:spPr>
-      </p:pic>
-      <p:pic>
-        <p:nvPicPr>
-          <p:cNvPr id="16" name="Grafik 15">
-            <a:extLst>
-              <a:ext uri="{FF2B5EF4-FFF2-40B4-BE49-F238E27FC236}">
-                <a16:creationId xmlns:a16="http://schemas.microsoft.com/office/drawing/2014/main" id="{E0225BB7-1806-0968-3045-068217416AC9}"/>
-              </a:ext>
-            </a:extLst>
-          </p:cNvPr>
-          <p:cNvPicPr>
-            <a:picLocks noChangeAspect="1"/>
-          </p:cNvPicPr>
-          <p:nvPr/>
-        </p:nvPicPr>
-        <p:blipFill>
-          <a:blip r:embed="rId4">
-            <a:extLst>
-              <a:ext uri="{BEBA8EAE-BF5A-486C-A8C5-ECC9F3942E4B}">
-                <a14:imgProps xmlns:a14="http://schemas.microsoft.com/office/drawing/2010/main">
-                  <a14:imgLayer r:embed="rId5">
-                    <a14:imgEffect>
-                      <a14:backgroundRemoval t="0" b="98667" l="1778" r="99556">
-                        <a14:foregroundMark x1="30222" y1="20444" x2="30222" y2="20444"/>
-                        <a14:foregroundMark x1="32444" y1="20444" x2="62667" y2="20889"/>
-                        <a14:foregroundMark x1="65333" y1="21778" x2="65333" y2="58222"/>
-                        <a14:foregroundMark x1="65333" y1="58222" x2="35111" y2="68889"/>
-                        <a14:foregroundMark x1="35111" y1="68889" x2="8444" y2="47111"/>
-                        <a14:foregroundMark x1="8444" y1="47111" x2="46667" y2="15111"/>
-                        <a14:foregroundMark x1="46667" y1="15111" x2="74222" y2="13333"/>
-                        <a14:foregroundMark x1="74222" y1="13333" x2="88889" y2="39556"/>
-                        <a14:foregroundMark x1="88889" y1="39556" x2="79111" y2="70667"/>
-                        <a14:foregroundMark x1="79111" y1="70667" x2="52444" y2="88444"/>
-                        <a14:foregroundMark x1="52444" y1="88444" x2="31556" y2="57778"/>
-                        <a14:foregroundMark x1="31556" y1="57778" x2="54222" y2="41778"/>
-                        <a14:foregroundMark x1="54222" y1="41778" x2="36444" y2="56889"/>
-                        <a14:foregroundMark x1="36444" y1="56889" x2="62667" y2="50222"/>
-                        <a14:foregroundMark x1="62667" y1="50222" x2="58222" y2="42667"/>
-                        <a14:foregroundMark x1="48444" y1="40889" x2="44444" y2="34667"/>
-                        <a14:foregroundMark x1="47111" y1="6667" x2="51111" y2="4889"/>
-                        <a14:foregroundMark x1="2222" y1="48000" x2="4889" y2="60000"/>
-                        <a14:foregroundMark x1="68889" y1="44444" x2="76889" y2="52444"/>
-                        <a14:foregroundMark x1="61778" y1="50222" x2="50222" y2="30222"/>
-                        <a14:foregroundMark x1="50222" y1="30222" x2="32889" y2="45333"/>
-                        <a14:foregroundMark x1="32889" y1="45333" x2="40444" y2="48000"/>
-                        <a14:foregroundMark x1="52000" y1="98667" x2="43111" y2="92000"/>
-                        <a14:foregroundMark x1="96000" y1="42667" x2="96444" y2="53333"/>
-                        <a14:foregroundMark x1="44889" y1="51556" x2="43556" y2="41778"/>
-                        <a14:foregroundMark x1="53333" y1="444" x2="50667" y2="889"/>
-                        <a14:foregroundMark x1="58222" y1="39111" x2="43556" y2="44000"/>
-                        <a14:foregroundMark x1="43556" y1="44000" x2="44444" y2="38667"/>
-                        <a14:foregroundMark x1="41333" y1="44000" x2="39111" y2="44889"/>
-                        <a14:foregroundMark x1="99111" y1="53333" x2="99556" y2="52889"/>
-                      </a14:backgroundRemoval>
-                    </a14:imgEffect>
-                  </a14:imgLayer>
-                </a14:imgProps>
-              </a:ext>
-            </a:extLst>
-          </a:blip>
-          <a:stretch>
-            <a:fillRect/>
-          </a:stretch>
-        </p:blipFill>
-        <p:spPr>
-          <a:xfrm>
-            <a:off x="8603728" y="2780928"/>
-            <a:ext cx="252000" cy="252000"/>
-          </a:xfrm>
-          <a:prstGeom prst="rect">
-            <a:avLst/>
-          </a:prstGeom>
-        </p:spPr>
-      </p:pic>
-      <p:pic>
-        <p:nvPicPr>
-          <p:cNvPr id="17" name="Grafik 16">
-            <a:extLst>
-              <a:ext uri="{FF2B5EF4-FFF2-40B4-BE49-F238E27FC236}">
-                <a16:creationId xmlns:a16="http://schemas.microsoft.com/office/drawing/2014/main" id="{355A47A2-7697-44F7-27D7-E8220382DC9C}"/>
-              </a:ext>
-            </a:extLst>
-          </p:cNvPr>
-          <p:cNvPicPr>
-            <a:picLocks noChangeAspect="1"/>
-          </p:cNvPicPr>
-          <p:nvPr/>
-        </p:nvPicPr>
-        <p:blipFill>
-          <a:blip r:embed="rId4">
-            <a:extLst>
-              <a:ext uri="{BEBA8EAE-BF5A-486C-A8C5-ECC9F3942E4B}">
-                <a14:imgProps xmlns:a14="http://schemas.microsoft.com/office/drawing/2010/main">
-                  <a14:imgLayer r:embed="rId5">
-                    <a14:imgEffect>
-                      <a14:backgroundRemoval t="0" b="98667" l="1778" r="99556">
-                        <a14:foregroundMark x1="30222" y1="20444" x2="30222" y2="20444"/>
-                        <a14:foregroundMark x1="32444" y1="20444" x2="62667" y2="20889"/>
-                        <a14:foregroundMark x1="65333" y1="21778" x2="65333" y2="58222"/>
-                        <a14:foregroundMark x1="65333" y1="58222" x2="35111" y2="68889"/>
-                        <a14:foregroundMark x1="35111" y1="68889" x2="8444" y2="47111"/>
-                        <a14:foregroundMark x1="8444" y1="47111" x2="46667" y2="15111"/>
-                        <a14:foregroundMark x1="46667" y1="15111" x2="74222" y2="13333"/>
-                        <a14:foregroundMark x1="74222" y1="13333" x2="88889" y2="39556"/>
-                        <a14:foregroundMark x1="88889" y1="39556" x2="79111" y2="70667"/>
-                        <a14:foregroundMark x1="79111" y1="70667" x2="52444" y2="88444"/>
-                        <a14:foregroundMark x1="52444" y1="88444" x2="31556" y2="57778"/>
-                        <a14:foregroundMark x1="31556" y1="57778" x2="54222" y2="41778"/>
-                        <a14:foregroundMark x1="54222" y1="41778" x2="36444" y2="56889"/>
-                        <a14:foregroundMark x1="36444" y1="56889" x2="62667" y2="50222"/>
-                        <a14:foregroundMark x1="62667" y1="50222" x2="58222" y2="42667"/>
-                        <a14:foregroundMark x1="48444" y1="40889" x2="44444" y2="34667"/>
-                        <a14:foregroundMark x1="47111" y1="6667" x2="51111" y2="4889"/>
-                        <a14:foregroundMark x1="2222" y1="48000" x2="4889" y2="60000"/>
-                        <a14:foregroundMark x1="68889" y1="44444" x2="76889" y2="52444"/>
-                        <a14:foregroundMark x1="61778" y1="50222" x2="50222" y2="30222"/>
-                        <a14:foregroundMark x1="50222" y1="30222" x2="32889" y2="45333"/>
-                        <a14:foregroundMark x1="32889" y1="45333" x2="40444" y2="48000"/>
-                        <a14:foregroundMark x1="52000" y1="98667" x2="43111" y2="92000"/>
-                        <a14:foregroundMark x1="96000" y1="42667" x2="96444" y2="53333"/>
-                        <a14:foregroundMark x1="44889" y1="51556" x2="43556" y2="41778"/>
-                        <a14:foregroundMark x1="53333" y1="444" x2="50667" y2="889"/>
-                        <a14:foregroundMark x1="58222" y1="39111" x2="43556" y2="44000"/>
-                        <a14:foregroundMark x1="43556" y1="44000" x2="44444" y2="38667"/>
-                        <a14:foregroundMark x1="41333" y1="44000" x2="39111" y2="44889"/>
-                        <a14:foregroundMark x1="99111" y1="53333" x2="99556" y2="52889"/>
-                      </a14:backgroundRemoval>
-                    </a14:imgEffect>
-                  </a14:imgLayer>
-                </a14:imgProps>
-              </a:ext>
-            </a:extLst>
-          </a:blip>
-          <a:stretch>
-            <a:fillRect/>
-          </a:stretch>
-        </p:blipFill>
-        <p:spPr>
-          <a:xfrm>
-            <a:off x="5220072" y="2780928"/>
-            <a:ext cx="252000" cy="252000"/>
           </a:xfrm>
           <a:prstGeom prst="rect">
             <a:avLst/>
@@ -6722,103 +6637,39 @@
       </p:grpSpPr>
       <p:sp>
         <p:nvSpPr>
-          <p:cNvPr id="8" name="Titel 7">
+          <p:cNvPr id="4098" name="Rectangle 12"/>
+          <p:cNvSpPr>
+            <a:spLocks noGrp="1" noChangeArrowheads="1"/>
+          </p:cNvSpPr>
+          <p:nvPr>
+            <p:ph type="title"/>
+          </p:nvPr>
+        </p:nvSpPr>
+        <p:spPr>
+          <a:xfrm>
+            <a:off x="211139" y="153988"/>
+            <a:ext cx="6377086" cy="826740"/>
+          </a:xfrm>
+        </p:spPr>
+        <p:txBody>
+          <a:bodyPr/>
+          <a:lstStyle/>
+          <a:p>
+            <a:r>
+              <a:rPr lang="de-DE" dirty="0">
+                <a:latin typeface="Meta Pro" panose="02000503040000020004" pitchFamily="2" charset="0"/>
+              </a:rPr>
+              <a:t>Bausteinsicht &amp; Verteilungssicht </a:t>
+            </a:r>
+          </a:p>
+        </p:txBody>
+      </p:sp>
+      <p:sp>
+        <p:nvSpPr>
+          <p:cNvPr id="7" name="Datumsplatzhalter 4">
             <a:extLst>
               <a:ext uri="{FF2B5EF4-FFF2-40B4-BE49-F238E27FC236}">
-                <a16:creationId xmlns:a16="http://schemas.microsoft.com/office/drawing/2014/main" id="{371F76FA-E730-48FA-93B9-ACB75A91D749}"/>
-              </a:ext>
-            </a:extLst>
-          </p:cNvPr>
-          <p:cNvSpPr>
-            <a:spLocks noGrp="1"/>
-          </p:cNvSpPr>
-          <p:nvPr>
-            <p:ph type="ctrTitle" sz="quarter"/>
-          </p:nvPr>
-        </p:nvSpPr>
-        <p:spPr/>
-        <p:txBody>
-          <a:bodyPr/>
-          <a:lstStyle/>
-          <a:p>
-            <a:r>
-              <a:rPr lang="de-DE" dirty="0">
-                <a:latin typeface="Meta Pro" panose="02000503040000020004" pitchFamily="2" charset="0"/>
-              </a:rPr>
-              <a:t>Testabdeckung</a:t>
-            </a:r>
-          </a:p>
-        </p:txBody>
-      </p:sp>
-      <p:sp>
-        <p:nvSpPr>
-          <p:cNvPr id="4" name="Fußzeilenplatzhalter 3">
-            <a:extLst>
-              <a:ext uri="{FF2B5EF4-FFF2-40B4-BE49-F238E27FC236}">
-                <a16:creationId xmlns:a16="http://schemas.microsoft.com/office/drawing/2014/main" id="{27DB9698-1BAA-4F3E-9F3C-D32F78EF2CED}"/>
-              </a:ext>
-            </a:extLst>
-          </p:cNvPr>
-          <p:cNvSpPr>
-            <a:spLocks noGrp="1"/>
-          </p:cNvSpPr>
-          <p:nvPr>
-            <p:ph type="ftr" sz="quarter" idx="3"/>
-          </p:nvPr>
-        </p:nvSpPr>
-        <p:spPr/>
-        <p:txBody>
-          <a:bodyPr/>
-          <a:lstStyle/>
-          <a:p>
-            <a:r>
-              <a:rPr lang="de-DE" dirty="0" err="1"/>
-              <a:t>SGDb</a:t>
-            </a:r>
-            <a:endParaRPr lang="de-DE" dirty="0"/>
-          </a:p>
-        </p:txBody>
-      </p:sp>
-      <p:sp>
-        <p:nvSpPr>
-          <p:cNvPr id="3" name="Foliennummernplatzhalter 2">
-            <a:extLst>
-              <a:ext uri="{FF2B5EF4-FFF2-40B4-BE49-F238E27FC236}">
-                <a16:creationId xmlns:a16="http://schemas.microsoft.com/office/drawing/2014/main" id="{F92D2EFE-98CD-4649-8AFD-F3416778AE74}"/>
-              </a:ext>
-            </a:extLst>
-          </p:cNvPr>
-          <p:cNvSpPr>
-            <a:spLocks noGrp="1"/>
-          </p:cNvSpPr>
-          <p:nvPr>
-            <p:ph type="sldNum" sz="quarter" idx="4"/>
-          </p:nvPr>
-        </p:nvSpPr>
-        <p:spPr/>
-        <p:txBody>
-          <a:bodyPr/>
-          <a:lstStyle/>
-          <a:p>
-            <a:fld id="{58B5944C-422B-400C-ACEC-079F06A0E4F8}" type="slidenum">
-              <a:rPr lang="de-DE" smtClean="0">
-                <a:latin typeface="Meta Pro" panose="02000503040000020004" pitchFamily="2" charset="0"/>
-              </a:rPr>
-              <a:pPr/>
-              <a:t>5</a:t>
-            </a:fld>
-            <a:endParaRPr lang="de-DE" dirty="0">
-              <a:latin typeface="Meta Pro" panose="02000503040000020004" pitchFamily="2" charset="0"/>
-            </a:endParaRPr>
-          </a:p>
-        </p:txBody>
-      </p:sp>
-      <p:sp>
-        <p:nvSpPr>
-          <p:cNvPr id="2" name="Datumsplatzhalter 4">
-            <a:extLst>
-              <a:ext uri="{FF2B5EF4-FFF2-40B4-BE49-F238E27FC236}">
-                <a16:creationId xmlns:a16="http://schemas.microsoft.com/office/drawing/2014/main" id="{0D27BB6D-766A-E589-5FF8-0A56EF44A274}"/>
+                <a16:creationId xmlns:a16="http://schemas.microsoft.com/office/drawing/2014/main" id="{260E19FE-C12B-0B8E-4D67-29A01B6B6505}"/>
               </a:ext>
             </a:extLst>
           </p:cNvPr>
@@ -6852,10 +6703,124 @@
           </a:p>
         </p:txBody>
       </p:sp>
+      <p:sp>
+        <p:nvSpPr>
+          <p:cNvPr id="8" name="Fußzeilenplatzhalter 5">
+            <a:extLst>
+              <a:ext uri="{FF2B5EF4-FFF2-40B4-BE49-F238E27FC236}">
+                <a16:creationId xmlns:a16="http://schemas.microsoft.com/office/drawing/2014/main" id="{BDC896DB-EF21-84C3-3B99-F1D6899A5192}"/>
+              </a:ext>
+            </a:extLst>
+          </p:cNvPr>
+          <p:cNvSpPr>
+            <a:spLocks noGrp="1"/>
+          </p:cNvSpPr>
+          <p:nvPr>
+            <p:ph type="ftr" sz="quarter" idx="3"/>
+          </p:nvPr>
+        </p:nvSpPr>
+        <p:spPr>
+          <a:xfrm>
+            <a:off x="539792" y="6513414"/>
+            <a:ext cx="3240120" cy="327273"/>
+          </a:xfrm>
+        </p:spPr>
+        <p:txBody>
+          <a:bodyPr/>
+          <a:lstStyle/>
+          <a:p>
+            <a:r>
+              <a:rPr lang="de-DE" dirty="0" err="1">
+                <a:solidFill>
+                  <a:schemeClr val="bg1"/>
+                </a:solidFill>
+                <a:latin typeface="Meta Pro" panose="02000503040000020004" pitchFamily="2" charset="0"/>
+              </a:rPr>
+              <a:t>SGDb</a:t>
+            </a:r>
+            <a:endParaRPr lang="de-DE" dirty="0">
+              <a:solidFill>
+                <a:schemeClr val="bg1"/>
+              </a:solidFill>
+              <a:latin typeface="Meta Pro" panose="02000503040000020004" pitchFamily="2" charset="0"/>
+            </a:endParaRPr>
+          </a:p>
+        </p:txBody>
+      </p:sp>
+      <p:sp>
+        <p:nvSpPr>
+          <p:cNvPr id="9" name="Foliennummernplatzhalter 6">
+            <a:extLst>
+              <a:ext uri="{FF2B5EF4-FFF2-40B4-BE49-F238E27FC236}">
+                <a16:creationId xmlns:a16="http://schemas.microsoft.com/office/drawing/2014/main" id="{7B6E31DF-AE08-74A6-3007-0BDCC98ACF3B}"/>
+              </a:ext>
+            </a:extLst>
+          </p:cNvPr>
+          <p:cNvSpPr>
+            <a:spLocks noGrp="1"/>
+          </p:cNvSpPr>
+          <p:nvPr>
+            <p:ph type="sldNum" sz="quarter" idx="4"/>
+          </p:nvPr>
+        </p:nvSpPr>
+        <p:spPr>
+          <a:xfrm>
+            <a:off x="5292080" y="6677050"/>
+            <a:ext cx="758825" cy="162000"/>
+          </a:xfrm>
+        </p:spPr>
+        <p:txBody>
+          <a:bodyPr/>
+          <a:lstStyle/>
+          <a:p>
+            <a:pPr algn="l"/>
+            <a:fld id="{58B5944C-422B-400C-ACEC-079F06A0E4F8}" type="slidenum">
+              <a:rPr lang="de-DE" smtClean="0">
+                <a:latin typeface="Meta Pro" panose="02000503040000020004" pitchFamily="2" charset="0"/>
+              </a:rPr>
+              <a:pPr algn="l"/>
+              <a:t>5</a:t>
+            </a:fld>
+            <a:endParaRPr lang="de-DE" dirty="0">
+              <a:latin typeface="Meta Pro" panose="02000503040000020004" pitchFamily="2" charset="0"/>
+            </a:endParaRPr>
+          </a:p>
+        </p:txBody>
+      </p:sp>
+      <p:pic>
+        <p:nvPicPr>
+          <p:cNvPr id="3" name="Grafik 2">
+            <a:extLst>
+              <a:ext uri="{FF2B5EF4-FFF2-40B4-BE49-F238E27FC236}">
+                <a16:creationId xmlns:a16="http://schemas.microsoft.com/office/drawing/2014/main" id="{25305B74-0644-BC8E-7C02-CB0431A8CCD6}"/>
+              </a:ext>
+            </a:extLst>
+          </p:cNvPr>
+          <p:cNvPicPr>
+            <a:picLocks noChangeAspect="1"/>
+          </p:cNvPicPr>
+          <p:nvPr/>
+        </p:nvPicPr>
+        <p:blipFill>
+          <a:blip r:embed="rId3"/>
+          <a:stretch>
+            <a:fillRect/>
+          </a:stretch>
+        </p:blipFill>
+        <p:spPr>
+          <a:xfrm>
+            <a:off x="1526201" y="1398714"/>
+            <a:ext cx="6091598" cy="4896000"/>
+          </a:xfrm>
+          <a:prstGeom prst="rect">
+            <a:avLst/>
+          </a:prstGeom>
+        </p:spPr>
+      </p:pic>
     </p:spTree>
     <p:extLst>
       <p:ext uri="{BB962C8B-B14F-4D97-AF65-F5344CB8AC3E}">
-        <p14:creationId xmlns:p14="http://schemas.microsoft.com/office/powerpoint/2010/main" val="732982012"/>
+        <p14:creationId xmlns:p14="http://schemas.microsoft.com/office/powerpoint/2010/main" val="2062377277"/>
       </p:ext>
     </p:extLst>
   </p:cSld>
@@ -6884,6 +6849,168 @@
       </p:grpSpPr>
       <p:sp>
         <p:nvSpPr>
+          <p:cNvPr id="8" name="Titel 7">
+            <a:extLst>
+              <a:ext uri="{FF2B5EF4-FFF2-40B4-BE49-F238E27FC236}">
+                <a16:creationId xmlns:a16="http://schemas.microsoft.com/office/drawing/2014/main" id="{371F76FA-E730-48FA-93B9-ACB75A91D749}"/>
+              </a:ext>
+            </a:extLst>
+          </p:cNvPr>
+          <p:cNvSpPr>
+            <a:spLocks noGrp="1"/>
+          </p:cNvSpPr>
+          <p:nvPr>
+            <p:ph type="ctrTitle" sz="quarter"/>
+          </p:nvPr>
+        </p:nvSpPr>
+        <p:spPr/>
+        <p:txBody>
+          <a:bodyPr/>
+          <a:lstStyle/>
+          <a:p>
+            <a:r>
+              <a:rPr lang="de-DE" dirty="0">
+                <a:latin typeface="Meta Pro" panose="02000503040000020004" pitchFamily="2" charset="0"/>
+              </a:rPr>
+              <a:t>Testabdeckung</a:t>
+            </a:r>
+          </a:p>
+        </p:txBody>
+      </p:sp>
+      <p:sp>
+        <p:nvSpPr>
+          <p:cNvPr id="4" name="Fußzeilenplatzhalter 3">
+            <a:extLst>
+              <a:ext uri="{FF2B5EF4-FFF2-40B4-BE49-F238E27FC236}">
+                <a16:creationId xmlns:a16="http://schemas.microsoft.com/office/drawing/2014/main" id="{27DB9698-1BAA-4F3E-9F3C-D32F78EF2CED}"/>
+              </a:ext>
+            </a:extLst>
+          </p:cNvPr>
+          <p:cNvSpPr>
+            <a:spLocks noGrp="1"/>
+          </p:cNvSpPr>
+          <p:nvPr>
+            <p:ph type="ftr" sz="quarter" idx="3"/>
+          </p:nvPr>
+        </p:nvSpPr>
+        <p:spPr/>
+        <p:txBody>
+          <a:bodyPr/>
+          <a:lstStyle/>
+          <a:p>
+            <a:r>
+              <a:rPr lang="de-DE" dirty="0" err="1"/>
+              <a:t>SGDb</a:t>
+            </a:r>
+            <a:endParaRPr lang="de-DE" dirty="0"/>
+          </a:p>
+        </p:txBody>
+      </p:sp>
+      <p:sp>
+        <p:nvSpPr>
+          <p:cNvPr id="3" name="Foliennummernplatzhalter 2">
+            <a:extLst>
+              <a:ext uri="{FF2B5EF4-FFF2-40B4-BE49-F238E27FC236}">
+                <a16:creationId xmlns:a16="http://schemas.microsoft.com/office/drawing/2014/main" id="{F92D2EFE-98CD-4649-8AFD-F3416778AE74}"/>
+              </a:ext>
+            </a:extLst>
+          </p:cNvPr>
+          <p:cNvSpPr>
+            <a:spLocks noGrp="1"/>
+          </p:cNvSpPr>
+          <p:nvPr>
+            <p:ph type="sldNum" sz="quarter" idx="4"/>
+          </p:nvPr>
+        </p:nvSpPr>
+        <p:spPr/>
+        <p:txBody>
+          <a:bodyPr/>
+          <a:lstStyle/>
+          <a:p>
+            <a:fld id="{58B5944C-422B-400C-ACEC-079F06A0E4F8}" type="slidenum">
+              <a:rPr lang="de-DE" smtClean="0">
+                <a:latin typeface="Meta Pro" panose="02000503040000020004" pitchFamily="2" charset="0"/>
+              </a:rPr>
+              <a:pPr/>
+              <a:t>6</a:t>
+            </a:fld>
+            <a:endParaRPr lang="de-DE" dirty="0">
+              <a:latin typeface="Meta Pro" panose="02000503040000020004" pitchFamily="2" charset="0"/>
+            </a:endParaRPr>
+          </a:p>
+        </p:txBody>
+      </p:sp>
+      <p:sp>
+        <p:nvSpPr>
+          <p:cNvPr id="2" name="Datumsplatzhalter 4">
+            <a:extLst>
+              <a:ext uri="{FF2B5EF4-FFF2-40B4-BE49-F238E27FC236}">
+                <a16:creationId xmlns:a16="http://schemas.microsoft.com/office/drawing/2014/main" id="{0D27BB6D-766A-E589-5FF8-0A56EF44A274}"/>
+              </a:ext>
+            </a:extLst>
+          </p:cNvPr>
+          <p:cNvSpPr>
+            <a:spLocks noGrp="1"/>
+          </p:cNvSpPr>
+          <p:nvPr>
+            <p:ph type="dt" sz="half" idx="2"/>
+          </p:nvPr>
+        </p:nvSpPr>
+        <p:spPr>
+          <a:xfrm>
+            <a:off x="4139952" y="6678642"/>
+            <a:ext cx="1152128" cy="162000"/>
+          </a:xfrm>
+        </p:spPr>
+        <p:txBody>
+          <a:bodyPr/>
+          <a:lstStyle/>
+          <a:p>
+            <a:r>
+              <a:rPr lang="de-DE" dirty="0"/>
+              <a:t>17.01.2023</a:t>
+            </a:r>
+            <a:endParaRPr lang="de-DE" dirty="0">
+              <a:solidFill>
+                <a:schemeClr val="bg1"/>
+              </a:solidFill>
+              <a:latin typeface="Meta Pro" panose="02000503040000020004" pitchFamily="2" charset="0"/>
+            </a:endParaRPr>
+          </a:p>
+        </p:txBody>
+      </p:sp>
+    </p:spTree>
+    <p:extLst>
+      <p:ext uri="{BB962C8B-B14F-4D97-AF65-F5344CB8AC3E}">
+        <p14:creationId xmlns:p14="http://schemas.microsoft.com/office/powerpoint/2010/main" val="732982012"/>
+      </p:ext>
+    </p:extLst>
+  </p:cSld>
+  <p:clrMapOvr>
+    <a:masterClrMapping/>
+  </p:clrMapOvr>
+</p:sld>
+</file>
+
+<file path=ppt/slides/slide7.xml><?xml version="1.0" encoding="utf-8"?>
+<p:sld xmlns:a="http://schemas.openxmlformats.org/drawingml/2006/main" xmlns:r="http://schemas.openxmlformats.org/officeDocument/2006/relationships" xmlns:p="http://schemas.openxmlformats.org/presentationml/2006/main">
+  <p:cSld>
+    <p:spTree>
+      <p:nvGrpSpPr>
+        <p:cNvPr id="1" name=""/>
+        <p:cNvGrpSpPr/>
+        <p:nvPr/>
+      </p:nvGrpSpPr>
+      <p:grpSpPr>
+        <a:xfrm>
+          <a:off x="0" y="0"/>
+          <a:ext cx="0" cy="0"/>
+          <a:chOff x="0" y="0"/>
+          <a:chExt cx="0" cy="0"/>
+        </a:xfrm>
+      </p:grpSpPr>
+      <p:sp>
+        <p:nvSpPr>
           <p:cNvPr id="4098" name="Rectangle 12"/>
           <p:cNvSpPr>
             <a:spLocks noGrp="1" noChangeArrowheads="1"/>
@@ -7026,7 +7153,7 @@
                 <a:latin typeface="Meta Pro" panose="02000503040000020004" pitchFamily="2" charset="0"/>
               </a:rPr>
               <a:pPr algn="l"/>
-              <a:t>6</a:t>
+              <a:t>7</a:t>
             </a:fld>
             <a:endParaRPr lang="de-DE" dirty="0">
               <a:latin typeface="Meta Pro" panose="02000503040000020004" pitchFamily="2" charset="0"/>

</xml_diff>